<commit_message>
modified tiny errors in ppt
</commit_message>
<xml_diff>
--- a/trendmicro template.pptx
+++ b/trendmicro template.pptx
@@ -16669,7 +16669,7 @@
               <a:pPr>
                 <a:defRPr/>
               </a:pPr>
-              <a:t>8/10/2016</a:t>
+              <a:t>8/24/2016</a:t>
             </a:fld>
             <a:endParaRPr lang="en-US" dirty="0"/>
           </a:p>
@@ -16915,7 +16915,7 @@
               <a:pPr>
                 <a:defRPr/>
               </a:pPr>
-              <a:t>8/10/2016</a:t>
+              <a:t>8/24/2016</a:t>
             </a:fld>
             <a:endParaRPr lang="en-US" dirty="0"/>
           </a:p>
@@ -17385,7 +17385,7 @@
             <a:fld id="{5C8FD179-FCC0-409B-BF0B-B98312203495}" type="datetime1">
               <a:rPr lang="en-US" altLang="zh-TW"/>
               <a:pPr/>
-              <a:t>8/10/2016</a:t>
+              <a:t>8/24/2016</a:t>
             </a:fld>
             <a:endParaRPr lang="en-US" altLang="zh-TW" dirty="0"/>
           </a:p>
@@ -17560,7 +17560,7 @@
               <a:pPr>
                 <a:defRPr/>
               </a:pPr>
-              <a:t>8/10/2016</a:t>
+              <a:t>8/24/2016</a:t>
             </a:fld>
             <a:endParaRPr lang="en-US" dirty="0"/>
           </a:p>
@@ -17780,7 +17780,7 @@
               <a:pPr>
                 <a:defRPr/>
               </a:pPr>
-              <a:t>8/10/2016</a:t>
+              <a:t>8/24/2016</a:t>
             </a:fld>
             <a:endParaRPr lang="en-US" dirty="0"/>
           </a:p>
@@ -18014,7 +18014,7 @@
               <a:pPr>
                 <a:defRPr/>
               </a:pPr>
-              <a:t>8/10/2016</a:t>
+              <a:t>8/24/2016</a:t>
             </a:fld>
             <a:endParaRPr lang="en-US" dirty="0"/>
           </a:p>
@@ -18272,7 +18272,7 @@
               <a:pPr>
                 <a:defRPr/>
               </a:pPr>
-              <a:t>8/10/2016</a:t>
+              <a:t>8/24/2016</a:t>
             </a:fld>
             <a:endParaRPr lang="en-US" dirty="0"/>
           </a:p>
@@ -18595,7 +18595,7 @@
               <a:pPr>
                 <a:defRPr/>
               </a:pPr>
-              <a:t>8/10/2016</a:t>
+              <a:t>8/24/2016</a:t>
             </a:fld>
             <a:endParaRPr lang="en-US" dirty="0"/>
           </a:p>
@@ -18825,7 +18825,7 @@
               <a:pPr>
                 <a:defRPr/>
               </a:pPr>
-              <a:t>8/10/2016</a:t>
+              <a:t>8/24/2016</a:t>
             </a:fld>
             <a:endParaRPr lang="en-US" dirty="0"/>
           </a:p>
@@ -19158,7 +19158,7 @@
               <a:pPr>
                 <a:defRPr/>
               </a:pPr>
-              <a:t>8/10/2016</a:t>
+              <a:t>8/24/2016</a:t>
             </a:fld>
             <a:endParaRPr lang="en-US" dirty="0"/>
           </a:p>
@@ -19304,7 +19304,7 @@
               <a:pPr>
                 <a:defRPr/>
               </a:pPr>
-              <a:t>8/10/2016</a:t>
+              <a:t>8/24/2016</a:t>
             </a:fld>
             <a:endParaRPr lang="en-US" dirty="0"/>
           </a:p>
@@ -19427,7 +19427,7 @@
               <a:pPr>
                 <a:defRPr/>
               </a:pPr>
-              <a:t>8/10/2016</a:t>
+              <a:t>8/24/2016</a:t>
             </a:fld>
             <a:endParaRPr lang="en-US" dirty="0"/>
           </a:p>
@@ -19715,7 +19715,7 @@
               <a:pPr>
                 <a:defRPr/>
               </a:pPr>
-              <a:t>8/10/2016</a:t>
+              <a:t>8/24/2016</a:t>
             </a:fld>
             <a:endParaRPr lang="en-US" dirty="0"/>
           </a:p>
@@ -33107,11 +33107,7 @@
             </a:r>
             <a:r>
               <a:rPr lang="zh-CN" altLang="en-US" smtClean="0"/>
-              <a:t>本</a:t>
-            </a:r>
-            <a:r>
-              <a:rPr lang="zh-CN" altLang="en-US" smtClean="0"/>
-              <a:t>无序，</a:t>
+              <a:t>本无序，</a:t>
             </a:r>
             <a:r>
               <a:rPr lang="zh-CN" altLang="en-US" dirty="0" smtClean="0"/>
@@ -37523,24 +37519,24 @@
               <a:t>。根据递归树状图，</a:t>
             </a:r>
             <a:r>
-              <a:rPr lang="en-US" altLang="zh-CN" dirty="0" err="1" smtClean="0"/>
+              <a:rPr lang="en-US" altLang="zh-CN" dirty="0" err="1"/>
               <a:t>lcs</a:t>
             </a:r>
             <a:r>
-              <a:rPr lang="en-US" altLang="zh-CN" dirty="0" smtClean="0"/>
-              <a:t>(1,1</a:t>
+              <a:rPr lang="en-US" altLang="zh-CN" dirty="0"/>
+              <a:t>(1,1 )</a:t>
             </a:r>
             <a:r>
               <a:rPr lang="zh-CN" altLang="en-US" dirty="0" smtClean="0"/>
-              <a:t>被计算了两次</a:t>
-            </a:r>
-            <a:r>
-              <a:rPr lang="en-US" altLang="zh-CN" dirty="0" smtClean="0"/>
-              <a:t>)</a:t>
+              <a:t>被</a:t>
             </a:r>
             <a:r>
               <a:rPr lang="zh-CN" altLang="en-US" dirty="0" smtClean="0"/>
-              <a:t>。</a:t>
+              <a:t>计算了两</a:t>
+            </a:r>
+            <a:r>
+              <a:rPr lang="zh-CN" altLang="en-US" dirty="0" smtClean="0"/>
+              <a:t>次。</a:t>
             </a:r>
             <a:endParaRPr lang="en-US" altLang="zh-CN" dirty="0" smtClean="0"/>
           </a:p>
@@ -45358,12 +45354,6 @@
 </file>
 
 <file path=customXml/item1.xml><?xml version="1.0" encoding="utf-8"?>
-<p:properties xmlns:p="http://schemas.microsoft.com/office/2006/metadata/properties" xmlns:xsi="http://www.w3.org/2001/XMLSchema-instance" xmlns:pc="http://schemas.microsoft.com/office/infopath/2007/PartnerControls">
-  <documentManagement/>
-</p:properties>
-</file>
-
-<file path=customXml/item2.xml><?xml version="1.0" encoding="utf-8"?>
 <ct:contentTypeSchema xmlns:ct="http://schemas.microsoft.com/office/2006/metadata/contentType" xmlns:ma="http://schemas.microsoft.com/office/2006/metadata/properties/metaAttributes" ct:_="" ma:_="" ma:contentTypeName="Document" ma:contentTypeID="0x010100236A1409D70A004289B1A306A506FE0F" ma:contentTypeVersion="0" ma:contentTypeDescription="Create a new document." ma:contentTypeScope="" ma:versionID="44b6095126b1c04117fd76932e6f6d9e">
   <xsd:schema xmlns:xsd="http://www.w3.org/2001/XMLSchema" xmlns:xs="http://www.w3.org/2001/XMLSchema" xmlns:p="http://schemas.microsoft.com/office/2006/metadata/properties" targetNamespace="http://schemas.microsoft.com/office/2006/metadata/properties" ma:root="true" ma:fieldsID="c64490b4aec6201516c3a874156f37b2">
     <xsd:element name="properties">
@@ -45477,7 +45467,7 @@
 </ct:contentTypeSchema>
 </file>
 
-<file path=customXml/item3.xml><?xml version="1.0" encoding="utf-8"?>
+<file path=customXml/item2.xml><?xml version="1.0" encoding="utf-8"?>
 <?mso-contentType ?>
 <FormTemplates xmlns="http://schemas.microsoft.com/sharepoint/v3/contenttype/forms">
   <Display>DocumentLibraryForm</Display>
@@ -45486,22 +45476,13 @@
 </FormTemplates>
 </file>
 
-<file path=customXml/itemProps1.xml><?xml version="1.0" encoding="utf-8"?>
-<ds:datastoreItem xmlns:ds="http://schemas.openxmlformats.org/officeDocument/2006/customXml" ds:itemID="{9FC4B2BE-E23F-4A12-A9DC-64F9DB2716B3}">
-  <ds:schemaRefs>
-    <ds:schemaRef ds:uri="http://schemas.microsoft.com/office/2006/documentManagement/types"/>
-    <ds:schemaRef ds:uri="http://schemas.openxmlformats.org/package/2006/metadata/core-properties"/>
-    <ds:schemaRef ds:uri="http://www.w3.org/XML/1998/namespace"/>
-    <ds:schemaRef ds:uri="http://purl.org/dc/elements/1.1/"/>
-    <ds:schemaRef ds:uri="http://purl.org/dc/dcmitype/"/>
-    <ds:schemaRef ds:uri="http://purl.org/dc/terms/"/>
-    <ds:schemaRef ds:uri="http://schemas.microsoft.com/office/infopath/2007/PartnerControls"/>
-    <ds:schemaRef ds:uri="http://schemas.microsoft.com/office/2006/metadata/properties"/>
-  </ds:schemaRefs>
-</ds:datastoreItem>
+<file path=customXml/item3.xml><?xml version="1.0" encoding="utf-8"?>
+<p:properties xmlns:p="http://schemas.microsoft.com/office/2006/metadata/properties" xmlns:xsi="http://www.w3.org/2001/XMLSchema-instance" xmlns:pc="http://schemas.microsoft.com/office/infopath/2007/PartnerControls">
+  <documentManagement/>
+</p:properties>
 </file>
 
-<file path=customXml/itemProps2.xml><?xml version="1.0" encoding="utf-8"?>
+<file path=customXml/itemProps1.xml><?xml version="1.0" encoding="utf-8"?>
 <ds:datastoreItem xmlns:ds="http://schemas.openxmlformats.org/officeDocument/2006/customXml" ds:itemID="{B2441312-3F36-47C5-9306-1628FB80F79F}">
   <ds:schemaRefs>
     <ds:schemaRef ds:uri="http://schemas.microsoft.com/office/2006/metadata/contentType"/>
@@ -45517,10 +45498,25 @@
 </ds:datastoreItem>
 </file>
 
-<file path=customXml/itemProps3.xml><?xml version="1.0" encoding="utf-8"?>
+<file path=customXml/itemProps2.xml><?xml version="1.0" encoding="utf-8"?>
 <ds:datastoreItem xmlns:ds="http://schemas.openxmlformats.org/officeDocument/2006/customXml" ds:itemID="{B1238A3D-0C9C-45D5-A323-9473BCA055B8}">
   <ds:schemaRefs>
     <ds:schemaRef ds:uri="http://schemas.microsoft.com/sharepoint/v3/contenttype/forms"/>
   </ds:schemaRefs>
 </ds:datastoreItem>
+</file>
+
+<file path=customXml/itemProps3.xml><?xml version="1.0" encoding="utf-8"?>
+<ds:datastoreItem xmlns:ds="http://schemas.openxmlformats.org/officeDocument/2006/customXml" ds:itemID="{9FC4B2BE-E23F-4A12-A9DC-64F9DB2716B3}">
+  <ds:schemaRefs>
+    <ds:schemaRef ds:uri="http://schemas.microsoft.com/office/2006/documentManagement/types"/>
+    <ds:schemaRef ds:uri="http://schemas.openxmlformats.org/package/2006/metadata/core-properties"/>
+    <ds:schemaRef ds:uri="http://www.w3.org/XML/1998/namespace"/>
+    <ds:schemaRef ds:uri="http://purl.org/dc/elements/1.1/"/>
+    <ds:schemaRef ds:uri="http://purl.org/dc/dcmitype/"/>
+    <ds:schemaRef ds:uri="http://purl.org/dc/terms/"/>
+    <ds:schemaRef ds:uri="http://schemas.microsoft.com/office/infopath/2007/PartnerControls"/>
+    <ds:schemaRef ds:uri="http://schemas.microsoft.com/office/2006/metadata/properties"/>
+  </ds:schemaRefs>
+</ds:datastoreItem>
 </file>
</xml_diff>